<commit_message>
Refactor asset system to primitives-based architecture
Replace constrained diagram-type approach with flexible primitives
(box, arrow, line, text, circle, rect, group) that can be freely
composed to create any visual concept.

Changes:
- Rewrite svg-generator.js with primitive rendering methods
- Rewrite pptx-generator.js to match primitives approach
- Simplify cli.js to support primitives-only format
- Add simple-flow-example.json demonstrating new format
- Regenerate all dist files with new system

Token propagation verified - changing tokens.json regenerates
all outputs correctly.
</commit_message>
<xml_diff>
--- a/hlv-asset-system/dist/pptx/build-measure-learn.pptx
+++ b/hlv-asset-system/dist/pptx/build-measure-learn.pptx
@@ -876,286 +876,6 @@
         </p:nvSpPr>
         <p:spPr>
           <a:xfrm>
-            <a:off x="457200" y="274320"/>
-            <a:ext cx="8229600" cy="548640"/>
-          </a:xfrm>
-          <a:prstGeom prst="rect">
-            <a:avLst/>
-          </a:prstGeom>
-          <a:noFill/>
-          <a:ln/>
-        </p:spPr>
-        <p:txBody>
-          <a:bodyPr wrap="square" rtlCol="0" anchor="ctr"/>
-          <a:lstStyle/>
-          <a:p>
-            <a:pPr algn="ctr" indent="0" marL="0">
-              <a:buNone/>
-            </a:pPr>
-            <a:r>
-              <a:rPr lang="en-US" sz="2400" b="1" dirty="0">
-                <a:solidFill>
-                  <a:srgbClr val="182D53"/>
-                </a:solidFill>
-                <a:latin typeface="Manrope" pitchFamily="34" charset="0"/>
-                <a:ea typeface="Manrope" pitchFamily="34" charset="-122"/>
-                <a:cs typeface="Manrope" pitchFamily="34" charset="-120"/>
-              </a:rPr>
-              <a:t>Flow Title</a:t>
-            </a:r>
-            <a:endParaRPr lang="en-US" sz="2400" dirty="0"/>
-          </a:p>
-        </p:txBody>
-      </p:sp>
-      <p:sp>
-        <p:nvSpPr>
-          <p:cNvPr id="3" name="Shape 1"/>
-          <p:cNvSpPr/>
-          <p:nvPr/>
-        </p:nvSpPr>
-        <p:spPr>
-          <a:xfrm>
-            <a:off x="228600" y="762000"/>
-            <a:ext cx="762000" cy="381000"/>
-          </a:xfrm>
-          <a:prstGeom prst="roundRect">
-            <a:avLst>
-              <a:gd name="adj" fmla="val 12000"/>
-            </a:avLst>
-          </a:prstGeom>
-          <a:solidFill>
-            <a:srgbClr val="FFFFFF"/>
-          </a:solidFill>
-          <a:ln w="12700">
-            <a:solidFill>
-              <a:srgbClr val="D1D5DB"/>
-            </a:solidFill>
-            <a:prstDash val="solid"/>
-          </a:ln>
-        </p:spPr>
-      </p:sp>
-      <p:sp>
-        <p:nvSpPr>
-          <p:cNvPr id="4" name="Text 2"/>
-          <p:cNvSpPr/>
-          <p:nvPr/>
-        </p:nvSpPr>
-        <p:spPr>
-          <a:xfrm>
-            <a:off x="228600" y="762000"/>
-            <a:ext cx="762000" cy="381000"/>
-          </a:xfrm>
-          <a:prstGeom prst="rect">
-            <a:avLst/>
-          </a:prstGeom>
-          <a:noFill/>
-          <a:ln/>
-        </p:spPr>
-        <p:txBody>
-          <a:bodyPr wrap="square" rtlCol="0" anchor="ctr"/>
-          <a:lstStyle/>
-          <a:p>
-            <a:pPr algn="ctr" indent="0" marL="0">
-              <a:buNone/>
-            </a:pPr>
-            <a:r>
-              <a:rPr lang="en-US" sz="1100" b="1" dirty="0">
-                <a:solidFill>
-                  <a:srgbClr val="374151"/>
-                </a:solidFill>
-                <a:latin typeface="Manrope" pitchFamily="34" charset="0"/>
-                <a:ea typeface="Manrope" pitchFamily="34" charset="-122"/>
-                <a:cs typeface="Manrope" pitchFamily="34" charset="-120"/>
-              </a:rPr>
-              <a:t>Step 1</a:t>
-            </a:r>
-            <a:endParaRPr lang="en-US" sz="1100" dirty="0"/>
-          </a:p>
-        </p:txBody>
-      </p:sp>
-      <p:sp>
-        <p:nvSpPr>
-          <p:cNvPr id="5" name="Shape 3"/>
-          <p:cNvSpPr/>
-          <p:nvPr/>
-        </p:nvSpPr>
-        <p:spPr>
-          <a:xfrm>
-            <a:off x="990600" y="952500"/>
-            <a:ext cx="1462088" cy="0"/>
-          </a:xfrm>
-          <a:prstGeom prst="line">
-            <a:avLst/>
-          </a:prstGeom>
-          <a:noFill/>
-          <a:ln w="25400">
-            <a:solidFill>
-              <a:srgbClr val="182D53"/>
-            </a:solidFill>
-            <a:prstDash val="solid"/>
-            <a:tailEnd type="triangle"/>
-          </a:ln>
-        </p:spPr>
-      </p:sp>
-      <p:sp>
-        <p:nvSpPr>
-          <p:cNvPr id="6" name="Shape 4"/>
-          <p:cNvSpPr/>
-          <p:nvPr/>
-        </p:nvSpPr>
-        <p:spPr>
-          <a:xfrm>
-            <a:off x="2476500" y="762000"/>
-            <a:ext cx="762000" cy="381000"/>
-          </a:xfrm>
-          <a:prstGeom prst="roundRect">
-            <a:avLst>
-              <a:gd name="adj" fmla="val 12000"/>
-            </a:avLst>
-          </a:prstGeom>
-          <a:solidFill>
-            <a:srgbClr val="FFFFFF"/>
-          </a:solidFill>
-          <a:ln w="12700">
-            <a:solidFill>
-              <a:srgbClr val="D1D5DB"/>
-            </a:solidFill>
-            <a:prstDash val="solid"/>
-          </a:ln>
-        </p:spPr>
-      </p:sp>
-      <p:sp>
-        <p:nvSpPr>
-          <p:cNvPr id="7" name="Text 5"/>
-          <p:cNvSpPr/>
-          <p:nvPr/>
-        </p:nvSpPr>
-        <p:spPr>
-          <a:xfrm>
-            <a:off x="2476500" y="762000"/>
-            <a:ext cx="762000" cy="381000"/>
-          </a:xfrm>
-          <a:prstGeom prst="rect">
-            <a:avLst/>
-          </a:prstGeom>
-          <a:noFill/>
-          <a:ln/>
-        </p:spPr>
-        <p:txBody>
-          <a:bodyPr wrap="square" rtlCol="0" anchor="ctr"/>
-          <a:lstStyle/>
-          <a:p>
-            <a:pPr algn="ctr" indent="0" marL="0">
-              <a:buNone/>
-            </a:pPr>
-            <a:r>
-              <a:rPr lang="en-US" sz="1100" b="1" dirty="0">
-                <a:solidFill>
-                  <a:srgbClr val="374151"/>
-                </a:solidFill>
-                <a:latin typeface="Manrope" pitchFamily="34" charset="0"/>
-                <a:ea typeface="Manrope" pitchFamily="34" charset="-122"/>
-                <a:cs typeface="Manrope" pitchFamily="34" charset="-120"/>
-              </a:rPr>
-              <a:t>Step 2</a:t>
-            </a:r>
-            <a:endParaRPr lang="en-US" sz="1100" dirty="0"/>
-          </a:p>
-        </p:txBody>
-      </p:sp>
-      <p:sp>
-        <p:nvSpPr>
-          <p:cNvPr id="8" name="Shape 6"/>
-          <p:cNvSpPr/>
-          <p:nvPr/>
-        </p:nvSpPr>
-        <p:spPr>
-          <a:xfrm>
-            <a:off x="3238500" y="952500"/>
-            <a:ext cx="1462088" cy="0"/>
-          </a:xfrm>
-          <a:prstGeom prst="line">
-            <a:avLst/>
-          </a:prstGeom>
-          <a:noFill/>
-          <a:ln w="25400">
-            <a:solidFill>
-              <a:srgbClr val="182D53"/>
-            </a:solidFill>
-            <a:prstDash val="solid"/>
-            <a:tailEnd type="triangle"/>
-          </a:ln>
-        </p:spPr>
-      </p:sp>
-      <p:sp>
-        <p:nvSpPr>
-          <p:cNvPr id="9" name="Shape 7"/>
-          <p:cNvSpPr/>
-          <p:nvPr/>
-        </p:nvSpPr>
-        <p:spPr>
-          <a:xfrm>
-            <a:off x="4724400" y="762000"/>
-            <a:ext cx="762000" cy="381000"/>
-          </a:xfrm>
-          <a:prstGeom prst="roundRect">
-            <a:avLst>
-              <a:gd name="adj" fmla="val 12000"/>
-            </a:avLst>
-          </a:prstGeom>
-          <a:solidFill>
-            <a:srgbClr val="182D53"/>
-          </a:solidFill>
-          <a:ln/>
-        </p:spPr>
-      </p:sp>
-      <p:sp>
-        <p:nvSpPr>
-          <p:cNvPr id="10" name="Text 8"/>
-          <p:cNvSpPr/>
-          <p:nvPr/>
-        </p:nvSpPr>
-        <p:spPr>
-          <a:xfrm>
-            <a:off x="4724400" y="762000"/>
-            <a:ext cx="762000" cy="381000"/>
-          </a:xfrm>
-          <a:prstGeom prst="rect">
-            <a:avLst/>
-          </a:prstGeom>
-          <a:noFill/>
-          <a:ln/>
-        </p:spPr>
-        <p:txBody>
-          <a:bodyPr wrap="square" rtlCol="0" anchor="ctr"/>
-          <a:lstStyle/>
-          <a:p>
-            <a:pPr algn="ctr" indent="0" marL="0">
-              <a:buNone/>
-            </a:pPr>
-            <a:r>
-              <a:rPr lang="en-US" sz="1100" b="1" dirty="0">
-                <a:solidFill>
-                  <a:srgbClr val="FFFFFF"/>
-                </a:solidFill>
-                <a:latin typeface="Manrope" pitchFamily="34" charset="0"/>
-                <a:ea typeface="Manrope" pitchFamily="34" charset="-122"/>
-                <a:cs typeface="Manrope" pitchFamily="34" charset="-120"/>
-              </a:rPr>
-              <a:t>Step 3</a:t>
-            </a:r>
-            <a:endParaRPr lang="en-US" sz="1100" dirty="0"/>
-          </a:p>
-        </p:txBody>
-      </p:sp>
-      <p:sp>
-        <p:nvSpPr>
-          <p:cNvPr id="11" name="Text 9"/>
-          <p:cNvSpPr/>
-          <p:nvPr/>
-        </p:nvSpPr>
-        <p:spPr>
-          <a:xfrm>
             <a:off x="0" y="2667000"/>
             <a:ext cx="5715000" cy="274320"/>
           </a:xfrm>

</xml_diff>